<commit_message>
updated app flow large
</commit_message>
<xml_diff>
--- a/admin/MLB-PitchersFriend-ApplicationFlow.pptx
+++ b/admin/MLB-PitchersFriend-ApplicationFlow.pptx
@@ -4142,15 +4142,7 @@
             </a:br>
             <a:r>
               <a:rPr lang="en-US" sz="1000" dirty="0"/>
-              <a:t>(pitches, </a:t>
-            </a:r>
-            <a:r>
-              <a:rPr lang="en-US" sz="1000" dirty="0" err="1"/>
-              <a:t>atbat</a:t>
-            </a:r>
-            <a:r>
-              <a:rPr lang="en-US" sz="1000" dirty="0"/>
-              <a:t> events)</a:t>
+              <a:t>(pitches, atbat events)</a:t>
             </a:r>
             <a:endParaRPr lang="en-US" sz="1050" dirty="0"/>
           </a:p>
@@ -4227,15 +4219,7 @@
             </a:br>
             <a:r>
               <a:rPr lang="en-US" sz="1000" dirty="0"/>
-              <a:t>(pitches, </a:t>
-            </a:r>
-            <a:r>
-              <a:rPr lang="en-US" sz="1000" dirty="0" err="1"/>
-              <a:t>atbat</a:t>
-            </a:r>
-            <a:r>
-              <a:rPr lang="en-US" sz="1000" dirty="0"/>
-              <a:t> events)</a:t>
+              <a:t>(pitches, atbat events)</a:t>
             </a:r>
             <a:endParaRPr lang="en-US" sz="1050" dirty="0"/>
           </a:p>
@@ -4617,15 +4601,7 @@
           <a:p>
             <a:r>
               <a:rPr lang="en-US" sz="1000" dirty="0"/>
-              <a:t>Heat Map, </a:t>
-            </a:r>
-            <a:r>
-              <a:rPr lang="en-US" sz="1000" dirty="0" err="1"/>
-              <a:t>HitterVal</a:t>
-            </a:r>
-            <a:r>
-              <a:rPr lang="en-US" sz="1000" dirty="0"/>
-              <a:t> Map </a:t>
+              <a:t>Heat Map, HitterVal Map </a:t>
             </a:r>
             <a:endParaRPr lang="en-US" sz="1050" dirty="0"/>
           </a:p>
@@ -4927,14 +4903,10 @@
           <a:p>
             <a:r>
               <a:rPr lang="en-US" sz="1000" b="1" dirty="0" smtClean="0"/>
-              <a:t>Read </a:t>
-            </a:r>
-            <a:r>
-              <a:rPr lang="en-US" sz="1000" b="1" smtClean="0"/>
-              <a:t>Hitter Events </a:t>
-            </a:r>
-            <a:r>
-              <a:rPr lang="en-US" sz="1000" b="1" smtClean="0"/>
+              <a:t>Read Hitter Events </a:t>
+            </a:r>
+            <a:r>
+              <a:rPr lang="en-US" sz="1000" b="1" dirty="0" smtClean="0"/>
               <a:t>data</a:t>
             </a:r>
             <a:r>
@@ -4946,15 +4918,7 @@
             </a:br>
             <a:r>
               <a:rPr lang="en-US" sz="1000" dirty="0"/>
-              <a:t>(pitches, </a:t>
-            </a:r>
-            <a:r>
-              <a:rPr lang="en-US" sz="1000" dirty="0" err="1"/>
-              <a:t>atbat</a:t>
-            </a:r>
-            <a:r>
-              <a:rPr lang="en-US" sz="1000" dirty="0"/>
-              <a:t> events)</a:t>
+              <a:t>(pitches, atbat events)</a:t>
             </a:r>
             <a:endParaRPr lang="en-US" sz="1050" dirty="0"/>
           </a:p>
@@ -5081,15 +5045,83 @@
           <a:p>
             <a:r>
               <a:rPr lang="en-US" sz="1000" dirty="0"/>
-              <a:t>Heat Map, </a:t>
-            </a:r>
-            <a:r>
-              <a:rPr lang="en-US" sz="1000" dirty="0" err="1"/>
-              <a:t>HitterVal</a:t>
-            </a:r>
-            <a:r>
-              <a:rPr lang="en-US" sz="1000" dirty="0"/>
-              <a:t> Map </a:t>
+              <a:t>Heat Map, HitterVal Map </a:t>
+            </a:r>
+            <a:endParaRPr lang="en-US" sz="1050" dirty="0"/>
+          </a:p>
+        </p:txBody>
+      </p:sp>
+      <p:cxnSp>
+        <p:nvCxnSpPr>
+          <p:cNvPr id="67" name="Straight Arrow Connector 66"/>
+          <p:cNvCxnSpPr>
+            <a:stCxn id="30" idx="1"/>
+            <a:endCxn id="6" idx="7"/>
+          </p:cNvCxnSpPr>
+          <p:nvPr/>
+        </p:nvCxnSpPr>
+        <p:spPr>
+          <a:xfrm flipH="1">
+            <a:off x="7135706" y="2531353"/>
+            <a:ext cx="2999502" cy="752973"/>
+          </a:xfrm>
+          <a:prstGeom prst="straightConnector1">
+            <a:avLst/>
+          </a:prstGeom>
+          <a:ln>
+            <a:solidFill>
+              <a:schemeClr val="tx1"/>
+            </a:solidFill>
+            <a:tailEnd type="triangle"/>
+          </a:ln>
+        </p:spPr>
+        <p:style>
+          <a:lnRef idx="1">
+            <a:schemeClr val="accent1"/>
+          </a:lnRef>
+          <a:fillRef idx="0">
+            <a:schemeClr val="accent1"/>
+          </a:fillRef>
+          <a:effectRef idx="0">
+            <a:schemeClr val="accent1"/>
+          </a:effectRef>
+          <a:fontRef idx="minor">
+            <a:schemeClr val="tx1"/>
+          </a:fontRef>
+        </p:style>
+      </p:cxnSp>
+      <p:sp>
+        <p:nvSpPr>
+          <p:cNvPr id="68" name="TextBox 67"/>
+          <p:cNvSpPr txBox="1"/>
+          <p:nvPr/>
+        </p:nvSpPr>
+        <p:spPr>
+          <a:xfrm>
+            <a:off x="8159072" y="2358162"/>
+            <a:ext cx="1595708" cy="400110"/>
+          </a:xfrm>
+          <a:prstGeom prst="rect">
+            <a:avLst/>
+          </a:prstGeom>
+          <a:noFill/>
+        </p:spPr>
+        <p:txBody>
+          <a:bodyPr wrap="square" rtlCol="0">
+            <a:spAutoFit/>
+          </a:bodyPr>
+          <a:lstStyle/>
+          <a:p>
+            <a:r>
+              <a:rPr lang="en-US" sz="1000" b="1" dirty="0" smtClean="0"/>
+              <a:t>Load Player Info</a:t>
+            </a:r>
+            <a:endParaRPr lang="en-US" sz="1000" b="1" dirty="0"/>
+          </a:p>
+          <a:p>
+            <a:r>
+              <a:rPr lang="en-US" sz="1000" dirty="0" smtClean="0"/>
+              <a:t>Name, Vitals, etc. </a:t>
             </a:r>
             <a:endParaRPr lang="en-US" sz="1050" dirty="0"/>
           </a:p>

</xml_diff>